<commit_message>
Update profile short description.
</commit_message>
<xml_diff>
--- a/designs/question-answering.pptx
+++ b/designs/question-answering.pptx
@@ -8,6 +8,8 @@
     <p:sldId id="256" r:id="rId2"/>
     <p:sldId id="257" r:id="rId3"/>
     <p:sldId id="258" r:id="rId4"/>
+    <p:sldId id="259" r:id="rId5"/>
+    <p:sldId id="260" r:id="rId6"/>
   </p:sldIdLst>
   <p:sldSz cx="12192000" cy="6858000"/>
   <p:notesSz cx="6858000" cy="9144000"/>
@@ -106,6 +108,11 @@
       </a:defRPr>
     </a:lvl9pPr>
   </p:defaultTextStyle>
+  <p:extLst>
+    <p:ext uri="{EFAFB233-063F-42B5-8137-9DF3F51BA10A}">
+      <p15:sldGuideLst xmlns:p15="http://schemas.microsoft.com/office/powerpoint/2012/main"/>
+    </p:ext>
+  </p:extLst>
 </p:presentation>
 </file>
 
@@ -151,10 +158,9 @@
           </a:lstStyle>
           <a:p>
             <a:r>
-              <a:rPr lang="en-US" smtClean="0"/>
+              <a:rPr lang="en-US"/>
               <a:t>Click to edit Master title style</a:t>
             </a:r>
-            <a:endParaRPr lang="en-US"/>
           </a:p>
         </p:txBody>
       </p:sp>
@@ -216,10 +222,9 @@
           </a:lstStyle>
           <a:p>
             <a:r>
-              <a:rPr lang="en-US" smtClean="0"/>
+              <a:rPr lang="en-US"/>
               <a:t>Click to edit Master subtitle style</a:t>
             </a:r>
-            <a:endParaRPr lang="en-US"/>
           </a:p>
         </p:txBody>
       </p:sp>
@@ -240,7 +245,7 @@
           <a:p>
             <a:fld id="{EDF7D336-FDA6-F24C-8C63-EE1C12528735}" type="datetimeFigureOut">
               <a:rPr lang="en-US" smtClean="0"/>
-              <a:t>12/27/18</a:t>
+              <a:t>12/19/22</a:t>
             </a:fld>
             <a:endParaRPr lang="en-US"/>
           </a:p>
@@ -334,10 +339,9 @@
           <a:lstStyle/>
           <a:p>
             <a:r>
-              <a:rPr lang="en-US" smtClean="0"/>
+              <a:rPr lang="en-US"/>
               <a:t>Click to edit Master title style</a:t>
             </a:r>
-            <a:endParaRPr lang="en-US"/>
           </a:p>
         </p:txBody>
       </p:sp>
@@ -358,38 +362,37 @@
           <a:p>
             <a:pPr lvl="0"/>
             <a:r>
-              <a:rPr lang="en-US" smtClean="0"/>
+              <a:rPr lang="en-US"/>
               <a:t>Click to edit Master text styles</a:t>
             </a:r>
           </a:p>
           <a:p>
             <a:pPr lvl="1"/>
             <a:r>
-              <a:rPr lang="en-US" smtClean="0"/>
+              <a:rPr lang="en-US"/>
               <a:t>Second level</a:t>
             </a:r>
           </a:p>
           <a:p>
             <a:pPr lvl="2"/>
             <a:r>
-              <a:rPr lang="en-US" smtClean="0"/>
+              <a:rPr lang="en-US"/>
               <a:t>Third level</a:t>
             </a:r>
           </a:p>
           <a:p>
             <a:pPr lvl="3"/>
             <a:r>
-              <a:rPr lang="en-US" smtClean="0"/>
+              <a:rPr lang="en-US"/>
               <a:t>Fourth level</a:t>
             </a:r>
           </a:p>
           <a:p>
             <a:pPr lvl="4"/>
             <a:r>
-              <a:rPr lang="en-US" smtClean="0"/>
+              <a:rPr lang="en-US"/>
               <a:t>Fifth level</a:t>
             </a:r>
-            <a:endParaRPr lang="en-US"/>
           </a:p>
         </p:txBody>
       </p:sp>
@@ -410,7 +413,7 @@
           <a:p>
             <a:fld id="{EDF7D336-FDA6-F24C-8C63-EE1C12528735}" type="datetimeFigureOut">
               <a:rPr lang="en-US" smtClean="0"/>
-              <a:t>12/27/18</a:t>
+              <a:t>12/19/22</a:t>
             </a:fld>
             <a:endParaRPr lang="en-US"/>
           </a:p>
@@ -509,10 +512,9 @@
           <a:lstStyle/>
           <a:p>
             <a:r>
-              <a:rPr lang="en-US" smtClean="0"/>
+              <a:rPr lang="en-US"/>
               <a:t>Click to edit Master title style</a:t>
             </a:r>
-            <a:endParaRPr lang="en-US"/>
           </a:p>
         </p:txBody>
       </p:sp>
@@ -538,38 +540,37 @@
           <a:p>
             <a:pPr lvl="0"/>
             <a:r>
-              <a:rPr lang="en-US" smtClean="0"/>
+              <a:rPr lang="en-US"/>
               <a:t>Click to edit Master text styles</a:t>
             </a:r>
           </a:p>
           <a:p>
             <a:pPr lvl="1"/>
             <a:r>
-              <a:rPr lang="en-US" smtClean="0"/>
+              <a:rPr lang="en-US"/>
               <a:t>Second level</a:t>
             </a:r>
           </a:p>
           <a:p>
             <a:pPr lvl="2"/>
             <a:r>
-              <a:rPr lang="en-US" smtClean="0"/>
+              <a:rPr lang="en-US"/>
               <a:t>Third level</a:t>
             </a:r>
           </a:p>
           <a:p>
             <a:pPr lvl="3"/>
             <a:r>
-              <a:rPr lang="en-US" smtClean="0"/>
+              <a:rPr lang="en-US"/>
               <a:t>Fourth level</a:t>
             </a:r>
           </a:p>
           <a:p>
             <a:pPr lvl="4"/>
             <a:r>
-              <a:rPr lang="en-US" smtClean="0"/>
+              <a:rPr lang="en-US"/>
               <a:t>Fifth level</a:t>
             </a:r>
-            <a:endParaRPr lang="en-US"/>
           </a:p>
         </p:txBody>
       </p:sp>
@@ -590,7 +591,7 @@
           <a:p>
             <a:fld id="{EDF7D336-FDA6-F24C-8C63-EE1C12528735}" type="datetimeFigureOut">
               <a:rPr lang="en-US" smtClean="0"/>
-              <a:t>12/27/18</a:t>
+              <a:t>12/19/22</a:t>
             </a:fld>
             <a:endParaRPr lang="en-US"/>
           </a:p>
@@ -684,10 +685,9 @@
           <a:lstStyle/>
           <a:p>
             <a:r>
-              <a:rPr lang="en-US" smtClean="0"/>
+              <a:rPr lang="en-US"/>
               <a:t>Click to edit Master title style</a:t>
             </a:r>
-            <a:endParaRPr lang="en-US"/>
           </a:p>
         </p:txBody>
       </p:sp>
@@ -708,38 +708,37 @@
           <a:p>
             <a:pPr lvl="0"/>
             <a:r>
-              <a:rPr lang="en-US" smtClean="0"/>
+              <a:rPr lang="en-US"/>
               <a:t>Click to edit Master text styles</a:t>
             </a:r>
           </a:p>
           <a:p>
             <a:pPr lvl="1"/>
             <a:r>
-              <a:rPr lang="en-US" smtClean="0"/>
+              <a:rPr lang="en-US"/>
               <a:t>Second level</a:t>
             </a:r>
           </a:p>
           <a:p>
             <a:pPr lvl="2"/>
             <a:r>
-              <a:rPr lang="en-US" smtClean="0"/>
+              <a:rPr lang="en-US"/>
               <a:t>Third level</a:t>
             </a:r>
           </a:p>
           <a:p>
             <a:pPr lvl="3"/>
             <a:r>
-              <a:rPr lang="en-US" smtClean="0"/>
+              <a:rPr lang="en-US"/>
               <a:t>Fourth level</a:t>
             </a:r>
           </a:p>
           <a:p>
             <a:pPr lvl="4"/>
             <a:r>
-              <a:rPr lang="en-US" smtClean="0"/>
+              <a:rPr lang="en-US"/>
               <a:t>Fifth level</a:t>
             </a:r>
-            <a:endParaRPr lang="en-US"/>
           </a:p>
         </p:txBody>
       </p:sp>
@@ -760,7 +759,7 @@
           <a:p>
             <a:fld id="{EDF7D336-FDA6-F24C-8C63-EE1C12528735}" type="datetimeFigureOut">
               <a:rPr lang="en-US" smtClean="0"/>
-              <a:t>12/27/18</a:t>
+              <a:t>12/19/22</a:t>
             </a:fld>
             <a:endParaRPr lang="en-US"/>
           </a:p>
@@ -863,10 +862,9 @@
           </a:lstStyle>
           <a:p>
             <a:r>
-              <a:rPr lang="en-US" smtClean="0"/>
+              <a:rPr lang="en-US"/>
               <a:t>Click to edit Master title style</a:t>
             </a:r>
-            <a:endParaRPr lang="en-US"/>
           </a:p>
         </p:txBody>
       </p:sp>
@@ -983,7 +981,7 @@
           <a:p>
             <a:pPr lvl="0"/>
             <a:r>
-              <a:rPr lang="en-US" smtClean="0"/>
+              <a:rPr lang="en-US"/>
               <a:t>Click to edit Master text styles</a:t>
             </a:r>
           </a:p>
@@ -1006,7 +1004,7 @@
           <a:p>
             <a:fld id="{EDF7D336-FDA6-F24C-8C63-EE1C12528735}" type="datetimeFigureOut">
               <a:rPr lang="en-US" smtClean="0"/>
-              <a:t>12/27/18</a:t>
+              <a:t>12/19/22</a:t>
             </a:fld>
             <a:endParaRPr lang="en-US"/>
           </a:p>
@@ -1100,10 +1098,9 @@
           <a:lstStyle/>
           <a:p>
             <a:r>
-              <a:rPr lang="en-US" smtClean="0"/>
+              <a:rPr lang="en-US"/>
               <a:t>Click to edit Master title style</a:t>
             </a:r>
-            <a:endParaRPr lang="en-US"/>
           </a:p>
         </p:txBody>
       </p:sp>
@@ -1129,38 +1126,37 @@
           <a:p>
             <a:pPr lvl="0"/>
             <a:r>
-              <a:rPr lang="en-US" smtClean="0"/>
+              <a:rPr lang="en-US"/>
               <a:t>Click to edit Master text styles</a:t>
             </a:r>
           </a:p>
           <a:p>
             <a:pPr lvl="1"/>
             <a:r>
-              <a:rPr lang="en-US" smtClean="0"/>
+              <a:rPr lang="en-US"/>
               <a:t>Second level</a:t>
             </a:r>
           </a:p>
           <a:p>
             <a:pPr lvl="2"/>
             <a:r>
-              <a:rPr lang="en-US" smtClean="0"/>
+              <a:rPr lang="en-US"/>
               <a:t>Third level</a:t>
             </a:r>
           </a:p>
           <a:p>
             <a:pPr lvl="3"/>
             <a:r>
-              <a:rPr lang="en-US" smtClean="0"/>
+              <a:rPr lang="en-US"/>
               <a:t>Fourth level</a:t>
             </a:r>
           </a:p>
           <a:p>
             <a:pPr lvl="4"/>
             <a:r>
-              <a:rPr lang="en-US" smtClean="0"/>
+              <a:rPr lang="en-US"/>
               <a:t>Fifth level</a:t>
             </a:r>
-            <a:endParaRPr lang="en-US"/>
           </a:p>
         </p:txBody>
       </p:sp>
@@ -1186,38 +1182,37 @@
           <a:p>
             <a:pPr lvl="0"/>
             <a:r>
-              <a:rPr lang="en-US" smtClean="0"/>
+              <a:rPr lang="en-US"/>
               <a:t>Click to edit Master text styles</a:t>
             </a:r>
           </a:p>
           <a:p>
             <a:pPr lvl="1"/>
             <a:r>
-              <a:rPr lang="en-US" smtClean="0"/>
+              <a:rPr lang="en-US"/>
               <a:t>Second level</a:t>
             </a:r>
           </a:p>
           <a:p>
             <a:pPr lvl="2"/>
             <a:r>
-              <a:rPr lang="en-US" smtClean="0"/>
+              <a:rPr lang="en-US"/>
               <a:t>Third level</a:t>
             </a:r>
           </a:p>
           <a:p>
             <a:pPr lvl="3"/>
             <a:r>
-              <a:rPr lang="en-US" smtClean="0"/>
+              <a:rPr lang="en-US"/>
               <a:t>Fourth level</a:t>
             </a:r>
           </a:p>
           <a:p>
             <a:pPr lvl="4"/>
             <a:r>
-              <a:rPr lang="en-US" smtClean="0"/>
+              <a:rPr lang="en-US"/>
               <a:t>Fifth level</a:t>
             </a:r>
-            <a:endParaRPr lang="en-US"/>
           </a:p>
         </p:txBody>
       </p:sp>
@@ -1238,7 +1233,7 @@
           <a:p>
             <a:fld id="{EDF7D336-FDA6-F24C-8C63-EE1C12528735}" type="datetimeFigureOut">
               <a:rPr lang="en-US" smtClean="0"/>
-              <a:t>12/27/18</a:t>
+              <a:t>12/19/22</a:t>
             </a:fld>
             <a:endParaRPr lang="en-US"/>
           </a:p>
@@ -1337,10 +1332,9 @@
           <a:lstStyle/>
           <a:p>
             <a:r>
-              <a:rPr lang="en-US" smtClean="0"/>
+              <a:rPr lang="en-US"/>
               <a:t>Click to edit Master title style</a:t>
             </a:r>
-            <a:endParaRPr lang="en-US"/>
           </a:p>
         </p:txBody>
       </p:sp>
@@ -1403,7 +1397,7 @@
           <a:p>
             <a:pPr lvl="0"/>
             <a:r>
-              <a:rPr lang="en-US" smtClean="0"/>
+              <a:rPr lang="en-US"/>
               <a:t>Click to edit Master text styles</a:t>
             </a:r>
           </a:p>
@@ -1431,38 +1425,37 @@
           <a:p>
             <a:pPr lvl="0"/>
             <a:r>
-              <a:rPr lang="en-US" smtClean="0"/>
+              <a:rPr lang="en-US"/>
               <a:t>Click to edit Master text styles</a:t>
             </a:r>
           </a:p>
           <a:p>
             <a:pPr lvl="1"/>
             <a:r>
-              <a:rPr lang="en-US" smtClean="0"/>
+              <a:rPr lang="en-US"/>
               <a:t>Second level</a:t>
             </a:r>
           </a:p>
           <a:p>
             <a:pPr lvl="2"/>
             <a:r>
-              <a:rPr lang="en-US" smtClean="0"/>
+              <a:rPr lang="en-US"/>
               <a:t>Third level</a:t>
             </a:r>
           </a:p>
           <a:p>
             <a:pPr lvl="3"/>
             <a:r>
-              <a:rPr lang="en-US" smtClean="0"/>
+              <a:rPr lang="en-US"/>
               <a:t>Fourth level</a:t>
             </a:r>
           </a:p>
           <a:p>
             <a:pPr lvl="4"/>
             <a:r>
-              <a:rPr lang="en-US" smtClean="0"/>
+              <a:rPr lang="en-US"/>
               <a:t>Fifth level</a:t>
             </a:r>
-            <a:endParaRPr lang="en-US"/>
           </a:p>
         </p:txBody>
       </p:sp>
@@ -1525,7 +1518,7 @@
           <a:p>
             <a:pPr lvl="0"/>
             <a:r>
-              <a:rPr lang="en-US" smtClean="0"/>
+              <a:rPr lang="en-US"/>
               <a:t>Click to edit Master text styles</a:t>
             </a:r>
           </a:p>
@@ -1553,38 +1546,37 @@
           <a:p>
             <a:pPr lvl="0"/>
             <a:r>
-              <a:rPr lang="en-US" smtClean="0"/>
+              <a:rPr lang="en-US"/>
               <a:t>Click to edit Master text styles</a:t>
             </a:r>
           </a:p>
           <a:p>
             <a:pPr lvl="1"/>
             <a:r>
-              <a:rPr lang="en-US" smtClean="0"/>
+              <a:rPr lang="en-US"/>
               <a:t>Second level</a:t>
             </a:r>
           </a:p>
           <a:p>
             <a:pPr lvl="2"/>
             <a:r>
-              <a:rPr lang="en-US" smtClean="0"/>
+              <a:rPr lang="en-US"/>
               <a:t>Third level</a:t>
             </a:r>
           </a:p>
           <a:p>
             <a:pPr lvl="3"/>
             <a:r>
-              <a:rPr lang="en-US" smtClean="0"/>
+              <a:rPr lang="en-US"/>
               <a:t>Fourth level</a:t>
             </a:r>
           </a:p>
           <a:p>
             <a:pPr lvl="4"/>
             <a:r>
-              <a:rPr lang="en-US" smtClean="0"/>
+              <a:rPr lang="en-US"/>
               <a:t>Fifth level</a:t>
             </a:r>
-            <a:endParaRPr lang="en-US"/>
           </a:p>
         </p:txBody>
       </p:sp>
@@ -1605,7 +1597,7 @@
           <a:p>
             <a:fld id="{EDF7D336-FDA6-F24C-8C63-EE1C12528735}" type="datetimeFigureOut">
               <a:rPr lang="en-US" smtClean="0"/>
-              <a:t>12/27/18</a:t>
+              <a:t>12/19/22</a:t>
             </a:fld>
             <a:endParaRPr lang="en-US"/>
           </a:p>
@@ -1699,10 +1691,9 @@
           <a:lstStyle/>
           <a:p>
             <a:r>
-              <a:rPr lang="en-US" smtClean="0"/>
+              <a:rPr lang="en-US"/>
               <a:t>Click to edit Master title style</a:t>
             </a:r>
-            <a:endParaRPr lang="en-US"/>
           </a:p>
         </p:txBody>
       </p:sp>
@@ -1723,7 +1714,7 @@
           <a:p>
             <a:fld id="{EDF7D336-FDA6-F24C-8C63-EE1C12528735}" type="datetimeFigureOut">
               <a:rPr lang="en-US" smtClean="0"/>
-              <a:t>12/27/18</a:t>
+              <a:t>12/19/22</a:t>
             </a:fld>
             <a:endParaRPr lang="en-US"/>
           </a:p>
@@ -1818,7 +1809,7 @@
           <a:p>
             <a:fld id="{EDF7D336-FDA6-F24C-8C63-EE1C12528735}" type="datetimeFigureOut">
               <a:rPr lang="en-US" smtClean="0"/>
-              <a:t>12/27/18</a:t>
+              <a:t>12/19/22</a:t>
             </a:fld>
             <a:endParaRPr lang="en-US"/>
           </a:p>
@@ -1921,10 +1912,9 @@
           </a:lstStyle>
           <a:p>
             <a:r>
-              <a:rPr lang="en-US" smtClean="0"/>
+              <a:rPr lang="en-US"/>
               <a:t>Click to edit Master title style</a:t>
             </a:r>
-            <a:endParaRPr lang="en-US"/>
           </a:p>
         </p:txBody>
       </p:sp>
@@ -1978,38 +1968,37 @@
           <a:p>
             <a:pPr lvl="0"/>
             <a:r>
-              <a:rPr lang="en-US" smtClean="0"/>
+              <a:rPr lang="en-US"/>
               <a:t>Click to edit Master text styles</a:t>
             </a:r>
           </a:p>
           <a:p>
             <a:pPr lvl="1"/>
             <a:r>
-              <a:rPr lang="en-US" smtClean="0"/>
+              <a:rPr lang="en-US"/>
               <a:t>Second level</a:t>
             </a:r>
           </a:p>
           <a:p>
             <a:pPr lvl="2"/>
             <a:r>
-              <a:rPr lang="en-US" smtClean="0"/>
+              <a:rPr lang="en-US"/>
               <a:t>Third level</a:t>
             </a:r>
           </a:p>
           <a:p>
             <a:pPr lvl="3"/>
             <a:r>
-              <a:rPr lang="en-US" smtClean="0"/>
+              <a:rPr lang="en-US"/>
               <a:t>Fourth level</a:t>
             </a:r>
           </a:p>
           <a:p>
             <a:pPr lvl="4"/>
             <a:r>
-              <a:rPr lang="en-US" smtClean="0"/>
+              <a:rPr lang="en-US"/>
               <a:t>Fifth level</a:t>
             </a:r>
-            <a:endParaRPr lang="en-US"/>
           </a:p>
         </p:txBody>
       </p:sp>
@@ -2072,7 +2061,7 @@
           <a:p>
             <a:pPr lvl="0"/>
             <a:r>
-              <a:rPr lang="en-US" smtClean="0"/>
+              <a:rPr lang="en-US"/>
               <a:t>Click to edit Master text styles</a:t>
             </a:r>
           </a:p>
@@ -2095,7 +2084,7 @@
           <a:p>
             <a:fld id="{EDF7D336-FDA6-F24C-8C63-EE1C12528735}" type="datetimeFigureOut">
               <a:rPr lang="en-US" smtClean="0"/>
-              <a:t>12/27/18</a:t>
+              <a:t>12/19/22</a:t>
             </a:fld>
             <a:endParaRPr lang="en-US"/>
           </a:p>
@@ -2198,10 +2187,9 @@
           </a:lstStyle>
           <a:p>
             <a:r>
-              <a:rPr lang="en-US" smtClean="0"/>
+              <a:rPr lang="en-US"/>
               <a:t>Click to edit Master title style</a:t>
             </a:r>
-            <a:endParaRPr lang="en-US"/>
           </a:p>
         </p:txBody>
       </p:sp>
@@ -2325,7 +2313,7 @@
           <a:p>
             <a:pPr lvl="0"/>
             <a:r>
-              <a:rPr lang="en-US" smtClean="0"/>
+              <a:rPr lang="en-US"/>
               <a:t>Click to edit Master text styles</a:t>
             </a:r>
           </a:p>
@@ -2348,7 +2336,7 @@
           <a:p>
             <a:fld id="{EDF7D336-FDA6-F24C-8C63-EE1C12528735}" type="datetimeFigureOut">
               <a:rPr lang="en-US" smtClean="0"/>
-              <a:t>12/27/18</a:t>
+              <a:t>12/19/22</a:t>
             </a:fld>
             <a:endParaRPr lang="en-US"/>
           </a:p>
@@ -2457,10 +2445,9 @@
           <a:lstStyle/>
           <a:p>
             <a:r>
-              <a:rPr lang="en-US" smtClean="0"/>
+              <a:rPr lang="en-US"/>
               <a:t>Click to edit Master title style</a:t>
             </a:r>
-            <a:endParaRPr lang="en-US"/>
           </a:p>
         </p:txBody>
       </p:sp>
@@ -2491,38 +2478,37 @@
           <a:p>
             <a:pPr lvl="0"/>
             <a:r>
-              <a:rPr lang="en-US" smtClean="0"/>
+              <a:rPr lang="en-US"/>
               <a:t>Click to edit Master text styles</a:t>
             </a:r>
           </a:p>
           <a:p>
             <a:pPr lvl="1"/>
             <a:r>
-              <a:rPr lang="en-US" smtClean="0"/>
+              <a:rPr lang="en-US"/>
               <a:t>Second level</a:t>
             </a:r>
           </a:p>
           <a:p>
             <a:pPr lvl="2"/>
             <a:r>
-              <a:rPr lang="en-US" smtClean="0"/>
+              <a:rPr lang="en-US"/>
               <a:t>Third level</a:t>
             </a:r>
           </a:p>
           <a:p>
             <a:pPr lvl="3"/>
             <a:r>
-              <a:rPr lang="en-US" smtClean="0"/>
+              <a:rPr lang="en-US"/>
               <a:t>Fourth level</a:t>
             </a:r>
           </a:p>
           <a:p>
             <a:pPr lvl="4"/>
             <a:r>
-              <a:rPr lang="en-US" smtClean="0"/>
+              <a:rPr lang="en-US"/>
               <a:t>Fifth level</a:t>
             </a:r>
-            <a:endParaRPr lang="en-US"/>
           </a:p>
         </p:txBody>
       </p:sp>
@@ -2561,7 +2547,7 @@
           <a:p>
             <a:fld id="{EDF7D336-FDA6-F24C-8C63-EE1C12528735}" type="datetimeFigureOut">
               <a:rPr lang="en-US" smtClean="0"/>
-              <a:t>12/27/18</a:t>
+              <a:t>12/19/22</a:t>
             </a:fld>
             <a:endParaRPr lang="en-US"/>
           </a:p>
@@ -3070,19 +3056,19 @@
           <a:lstStyle/>
           <a:p>
             <a:r>
-              <a:rPr lang="en-US" i="1" dirty="0" smtClean="0">
+              <a:rPr lang="en-US" i="1" dirty="0">
                 <a:latin typeface="+mj-lt"/>
               </a:rPr>
               <a:t>Question</a:t>
             </a:r>
             <a:r>
-              <a:rPr lang="en-US" dirty="0" smtClean="0">
+              <a:rPr lang="en-US" dirty="0">
                 <a:latin typeface="+mj-lt"/>
               </a:rPr>
               <a:t>:</a:t>
             </a:r>
             <a:r>
-              <a:rPr lang="en-US" dirty="0" smtClean="0"/>
+              <a:rPr lang="en-US" dirty="0"/>
               <a:t> What are the benefits of sage spices?</a:t>
             </a:r>
           </a:p>
@@ -3123,44 +3109,20 @@
           <a:lstStyle/>
           <a:p>
             <a:r>
-              <a:rPr lang="en-US" i="1" dirty="0" smtClean="0">
+              <a:rPr lang="en-US" i="1" dirty="0">
                 <a:latin typeface="+mj-lt"/>
               </a:rPr>
               <a:t>Context</a:t>
             </a:r>
             <a:r>
-              <a:rPr lang="en-US" dirty="0" smtClean="0">
+              <a:rPr lang="en-US" dirty="0">
                 <a:latin typeface="+mj-lt"/>
               </a:rPr>
               <a:t>:</a:t>
             </a:r>
             <a:r>
-              <a:rPr lang="en-US" dirty="0" smtClean="0"/>
-              <a:t> </a:t>
-            </a:r>
-            <a:r>
               <a:rPr lang="en-US" dirty="0"/>
-              <a:t>Sage has both </a:t>
-            </a:r>
-            <a:r>
-              <a:rPr lang="en-US" dirty="0" smtClean="0"/>
-              <a:t>anti-oxidant and anti-inflammatory properties. Like </a:t>
-            </a:r>
-            <a:r>
-              <a:rPr lang="en-US" dirty="0"/>
-              <a:t>its family members, rosemary and mint, </a:t>
-            </a:r>
-            <a:r>
-              <a:rPr lang="en-US" dirty="0" smtClean="0"/>
-              <a:t>sage </a:t>
-            </a:r>
-            <a:r>
-              <a:rPr lang="en-US" dirty="0"/>
-              <a:t>contains useful flavonoids and phenolic acids, which are known to boost health and help numerous ailments</a:t>
-            </a:r>
-            <a:r>
-              <a:rPr lang="en-US" dirty="0" smtClean="0"/>
-              <a:t>.</a:t>
+              <a:t> Sage has both anti-oxidant and anti-inflammatory properties. Like its family members, rosemary and mint, sage contains useful flavonoids and phenolic acids, which are known to boost health and help numerous ailments.</a:t>
             </a:r>
           </a:p>
         </p:txBody>
@@ -3200,34 +3162,21 @@
           <a:lstStyle/>
           <a:p>
             <a:r>
-              <a:rPr lang="en-US" i="1" dirty="0" smtClean="0">
+              <a:rPr lang="en-US" i="1" dirty="0">
                 <a:latin typeface="+mj-lt"/>
               </a:rPr>
               <a:t>Answer</a:t>
             </a:r>
             <a:r>
-              <a:rPr lang="en-US" dirty="0" smtClean="0">
+              <a:rPr lang="en-US" dirty="0">
                 <a:latin typeface="+mj-lt"/>
               </a:rPr>
               <a:t>:</a:t>
             </a:r>
             <a:r>
-              <a:rPr lang="en-US" dirty="0" smtClean="0"/>
-              <a:t> “</a:t>
-            </a:r>
-            <a:r>
-              <a:rPr lang="en-US" dirty="0" smtClean="0"/>
-              <a:t>anti-oxidant and anti-inflammatory properties”, </a:t>
-            </a:r>
-            <a:r>
-              <a:rPr lang="en-US" dirty="0" smtClean="0"/>
-              <a:t>“</a:t>
-            </a:r>
-            <a:r>
-              <a:rPr lang="en-US" dirty="0" smtClean="0"/>
-              <a:t>useful flavonoids and phenolic acids”, “boost health and help numerous ailments”</a:t>
-            </a:r>
-            <a:endParaRPr lang="en-US" dirty="0" smtClean="0"/>
+              <a:rPr lang="en-US" dirty="0"/>
+              <a:t> “anti-oxidant and anti-inflammatory properties”, “useful flavonoids and phenolic acids”, “boost health and help numerous ailments”</a:t>
+            </a:r>
           </a:p>
         </p:txBody>
       </p:sp>
@@ -3286,7 +3235,13 @@
                 <a:tableStyleId>{F2DE63D5-997A-4646-A377-4702673A728D}</a:tableStyleId>
               </a:tblPr>
               <a:tblGrid>
-                <a:gridCol w="3300396"/>
+                <a:gridCol w="3300396">
+                  <a:extLst>
+                    <a:ext uri="{9D8B030D-6E8A-4147-A177-3AD203B41FA5}">
+                      <a16:colId xmlns:a16="http://schemas.microsoft.com/office/drawing/2014/main" val="20000"/>
+                    </a:ext>
+                  </a:extLst>
+                </a:gridCol>
               </a:tblGrid>
               <a:tr h="370840">
                 <a:tc>
@@ -3295,10 +3250,9 @@
                     <a:lstStyle/>
                     <a:p>
                       <a:r>
-                        <a:rPr lang="en-US" dirty="0" smtClean="0"/>
+                        <a:rPr lang="en-US" dirty="0"/>
                         <a:t>Description</a:t>
                       </a:r>
-                      <a:endParaRPr lang="en-US" dirty="0"/>
                     </a:p>
                   </a:txBody>
                   <a:tcPr>
@@ -3307,6 +3261,11 @@
                     </a:solidFill>
                   </a:tcPr>
                 </a:tc>
+                <a:extLst>
+                  <a:ext uri="{0D108BD9-81ED-4DB2-BD59-A6C34878D82A}">
+                    <a16:rowId xmlns:a16="http://schemas.microsoft.com/office/drawing/2014/main" val="10000"/>
+                  </a:ext>
+                </a:extLst>
               </a:tr>
               <a:tr h="370840">
                 <a:tc>
@@ -3315,11 +3274,11 @@
                     <a:lstStyle/>
                     <a:p>
                       <a:r>
-                        <a:rPr lang="en-US" dirty="0" smtClean="0"/>
+                        <a:rPr lang="en-US" dirty="0"/>
                         <a:t>GODADDY</a:t>
                       </a:r>
                       <a:r>
-                        <a:rPr lang="en-US" baseline="0" dirty="0" smtClean="0"/>
+                        <a:rPr lang="en-US" baseline="0" dirty="0"/>
                         <a:t> COM 480-5058855 AZ</a:t>
                       </a:r>
                       <a:endParaRPr lang="en-US" dirty="0"/>
@@ -3327,6 +3286,11 @@
                   </a:txBody>
                   <a:tcPr/>
                 </a:tc>
+                <a:extLst>
+                  <a:ext uri="{0D108BD9-81ED-4DB2-BD59-A6C34878D82A}">
+                    <a16:rowId xmlns:a16="http://schemas.microsoft.com/office/drawing/2014/main" val="10001"/>
+                  </a:ext>
+                </a:extLst>
               </a:tr>
               <a:tr h="370840">
                 <a:tc>
@@ -3335,11 +3299,11 @@
                     <a:lstStyle/>
                     <a:p>
                       <a:r>
-                        <a:rPr lang="en-US" dirty="0" smtClean="0"/>
+                        <a:rPr lang="en-US" dirty="0"/>
                         <a:t>EXXONMOBIL 76147610</a:t>
                       </a:r>
                       <a:r>
-                        <a:rPr lang="en-US" baseline="0" dirty="0" smtClean="0"/>
+                        <a:rPr lang="en-US" baseline="0" dirty="0"/>
                         <a:t> WEST…</a:t>
                       </a:r>
                       <a:endParaRPr lang="en-US" dirty="0"/>
@@ -3347,6 +3311,11 @@
                   </a:txBody>
                   <a:tcPr/>
                 </a:tc>
+                <a:extLst>
+                  <a:ext uri="{0D108BD9-81ED-4DB2-BD59-A6C34878D82A}">
+                    <a16:rowId xmlns:a16="http://schemas.microsoft.com/office/drawing/2014/main" val="10002"/>
+                  </a:ext>
+                </a:extLst>
               </a:tr>
               <a:tr h="370840">
                 <a:tc>
@@ -3355,11 +3324,11 @@
                     <a:lstStyle/>
                     <a:p>
                       <a:r>
-                        <a:rPr lang="en-US" dirty="0" smtClean="0"/>
+                        <a:rPr lang="en-US" dirty="0"/>
                         <a:t>ANTHONYS COAL FIRED PIZZA</a:t>
                       </a:r>
                       <a:r>
-                        <a:rPr lang="en-US" baseline="0" dirty="0" smtClean="0"/>
+                        <a:rPr lang="en-US" baseline="0" dirty="0"/>
                         <a:t> … </a:t>
                       </a:r>
                       <a:endParaRPr lang="en-US" dirty="0"/>
@@ -3367,6 +3336,11 @@
                   </a:txBody>
                   <a:tcPr/>
                 </a:tc>
+                <a:extLst>
+                  <a:ext uri="{0D108BD9-81ED-4DB2-BD59-A6C34878D82A}">
+                    <a16:rowId xmlns:a16="http://schemas.microsoft.com/office/drawing/2014/main" val="10003"/>
+                  </a:ext>
+                </a:extLst>
               </a:tr>
               <a:tr h="370840">
                 <a:tc>
@@ -3375,11 +3349,11 @@
                     <a:lstStyle/>
                     <a:p>
                       <a:r>
-                        <a:rPr lang="en-US" dirty="0" smtClean="0"/>
+                        <a:rPr lang="en-US" dirty="0"/>
                         <a:t>GOOGLE*ADWS9169708823</a:t>
                       </a:r>
                       <a:r>
-                        <a:rPr lang="en-US" baseline="0" dirty="0" smtClean="0"/>
+                        <a:rPr lang="en-US" baseline="0" dirty="0"/>
                         <a:t> C…</a:t>
                       </a:r>
                       <a:endParaRPr lang="en-US" dirty="0"/>
@@ -3387,6 +3361,11 @@
                   </a:txBody>
                   <a:tcPr/>
                 </a:tc>
+                <a:extLst>
+                  <a:ext uri="{0D108BD9-81ED-4DB2-BD59-A6C34878D82A}">
+                    <a16:rowId xmlns:a16="http://schemas.microsoft.com/office/drawing/2014/main" val="10004"/>
+                  </a:ext>
+                </a:extLst>
               </a:tr>
               <a:tr h="370840">
                 <a:tc>
@@ -3395,14 +3374,18 @@
                     <a:lstStyle/>
                     <a:p>
                       <a:r>
-                        <a:rPr lang="en-US" dirty="0" smtClean="0"/>
+                        <a:rPr lang="en-US" dirty="0"/>
                         <a:t>SQ *MR. DEWIE'S FROZEN DE</a:t>
                       </a:r>
-                      <a:endParaRPr lang="en-US" dirty="0"/>
                     </a:p>
                   </a:txBody>
                   <a:tcPr/>
                 </a:tc>
+                <a:extLst>
+                  <a:ext uri="{0D108BD9-81ED-4DB2-BD59-A6C34878D82A}">
+                    <a16:rowId xmlns:a16="http://schemas.microsoft.com/office/drawing/2014/main" val="10005"/>
+                  </a:ext>
+                </a:extLst>
               </a:tr>
             </a:tbl>
           </a:graphicData>
@@ -3433,7 +3416,13 @@
                 <a:tableStyleId>{F2DE63D5-997A-4646-A377-4702673A728D}</a:tableStyleId>
               </a:tblPr>
               <a:tblGrid>
-                <a:gridCol w="2146968"/>
+                <a:gridCol w="2146968">
+                  <a:extLst>
+                    <a:ext uri="{9D8B030D-6E8A-4147-A177-3AD203B41FA5}">
+                      <a16:colId xmlns:a16="http://schemas.microsoft.com/office/drawing/2014/main" val="20000"/>
+                    </a:ext>
+                  </a:extLst>
+                </a:gridCol>
               </a:tblGrid>
               <a:tr h="370840">
                 <a:tc>
@@ -3442,11 +3431,11 @@
                     <a:lstStyle/>
                     <a:p>
                       <a:r>
-                        <a:rPr lang="en-US" dirty="0" smtClean="0"/>
+                        <a:rPr lang="en-US" dirty="0"/>
                         <a:t>Transaction</a:t>
                       </a:r>
                       <a:r>
-                        <a:rPr lang="en-US" baseline="0" dirty="0" smtClean="0"/>
+                        <a:rPr lang="en-US" baseline="0" dirty="0"/>
                         <a:t> Type</a:t>
                       </a:r>
                       <a:endParaRPr lang="en-US" dirty="0"/>
@@ -3458,6 +3447,11 @@
                     </a:solidFill>
                   </a:tcPr>
                 </a:tc>
+                <a:extLst>
+                  <a:ext uri="{0D108BD9-81ED-4DB2-BD59-A6C34878D82A}">
+                    <a16:rowId xmlns:a16="http://schemas.microsoft.com/office/drawing/2014/main" val="10000"/>
+                  </a:ext>
+                </a:extLst>
               </a:tr>
               <a:tr h="370840">
                 <a:tc>
@@ -3466,14 +3460,18 @@
                     <a:lstStyle/>
                     <a:p>
                       <a:r>
-                        <a:rPr lang="en-US" dirty="0" smtClean="0"/>
+                        <a:rPr lang="en-US" dirty="0"/>
                         <a:t>Internet</a:t>
                       </a:r>
-                      <a:endParaRPr lang="en-US" dirty="0"/>
                     </a:p>
                   </a:txBody>
                   <a:tcPr/>
                 </a:tc>
+                <a:extLst>
+                  <a:ext uri="{0D108BD9-81ED-4DB2-BD59-A6C34878D82A}">
+                    <a16:rowId xmlns:a16="http://schemas.microsoft.com/office/drawing/2014/main" val="10001"/>
+                  </a:ext>
+                </a:extLst>
               </a:tr>
               <a:tr h="370840">
                 <a:tc>
@@ -3482,14 +3480,18 @@
                     <a:lstStyle/>
                     <a:p>
                       <a:r>
-                        <a:rPr lang="en-US" dirty="0" smtClean="0"/>
+                        <a:rPr lang="en-US" dirty="0"/>
                         <a:t>Gas</a:t>
                       </a:r>
-                      <a:endParaRPr lang="en-US" dirty="0"/>
                     </a:p>
                   </a:txBody>
                   <a:tcPr/>
                 </a:tc>
+                <a:extLst>
+                  <a:ext uri="{0D108BD9-81ED-4DB2-BD59-A6C34878D82A}">
+                    <a16:rowId xmlns:a16="http://schemas.microsoft.com/office/drawing/2014/main" val="10002"/>
+                  </a:ext>
+                </a:extLst>
               </a:tr>
               <a:tr h="370840">
                 <a:tc>
@@ -3498,14 +3500,18 @@
                     <a:lstStyle/>
                     <a:p>
                       <a:r>
-                        <a:rPr lang="en-US" dirty="0" smtClean="0"/>
+                        <a:rPr lang="en-US" dirty="0"/>
                         <a:t>Restaurant</a:t>
                       </a:r>
-                      <a:endParaRPr lang="en-US" dirty="0"/>
                     </a:p>
                   </a:txBody>
                   <a:tcPr/>
                 </a:tc>
+                <a:extLst>
+                  <a:ext uri="{0D108BD9-81ED-4DB2-BD59-A6C34878D82A}">
+                    <a16:rowId xmlns:a16="http://schemas.microsoft.com/office/drawing/2014/main" val="10003"/>
+                  </a:ext>
+                </a:extLst>
               </a:tr>
               <a:tr h="370840">
                 <a:tc>
@@ -3514,14 +3520,18 @@
                     <a:lstStyle/>
                     <a:p>
                       <a:r>
-                        <a:rPr lang="en-US" dirty="0" smtClean="0"/>
+                        <a:rPr lang="en-US" dirty="0"/>
                         <a:t>Marketing</a:t>
                       </a:r>
-                      <a:endParaRPr lang="en-US" dirty="0"/>
                     </a:p>
                   </a:txBody>
                   <a:tcPr/>
                 </a:tc>
+                <a:extLst>
+                  <a:ext uri="{0D108BD9-81ED-4DB2-BD59-A6C34878D82A}">
+                    <a16:rowId xmlns:a16="http://schemas.microsoft.com/office/drawing/2014/main" val="10004"/>
+                  </a:ext>
+                </a:extLst>
               </a:tr>
               <a:tr h="370840">
                 <a:tc>
@@ -3530,14 +3540,18 @@
                     <a:lstStyle/>
                     <a:p>
                       <a:r>
-                        <a:rPr lang="en-US" dirty="0" smtClean="0"/>
+                        <a:rPr lang="en-US" dirty="0"/>
                         <a:t>Restaurant</a:t>
                       </a:r>
-                      <a:endParaRPr lang="en-US" dirty="0"/>
                     </a:p>
                   </a:txBody>
                   <a:tcPr/>
                 </a:tc>
+                <a:extLst>
+                  <a:ext uri="{0D108BD9-81ED-4DB2-BD59-A6C34878D82A}">
+                    <a16:rowId xmlns:a16="http://schemas.microsoft.com/office/drawing/2014/main" val="10005"/>
+                  </a:ext>
+                </a:extLst>
               </a:tr>
             </a:tbl>
           </a:graphicData>
@@ -3613,17 +3627,16 @@
           <a:p>
             <a:pPr algn="ctr"/>
             <a:r>
-              <a:rPr lang="en-US" dirty="0" smtClean="0"/>
+              <a:rPr lang="en-US" dirty="0"/>
               <a:t>ML Model </a:t>
             </a:r>
           </a:p>
           <a:p>
             <a:pPr algn="ctr"/>
             <a:r>
-              <a:rPr lang="en-US" dirty="0" smtClean="0"/>
+              <a:rPr lang="en-US" dirty="0"/>
               <a:t>Prediction</a:t>
             </a:r>
-            <a:endParaRPr lang="en-US" dirty="0"/>
           </a:p>
         </p:txBody>
       </p:sp>
@@ -3631,6 +3644,1044 @@
     <p:extLst>
       <p:ext uri="{BB962C8B-B14F-4D97-AF65-F5344CB8AC3E}">
         <p14:creationId xmlns:p14="http://schemas.microsoft.com/office/powerpoint/2010/main" val="2000990190"/>
+      </p:ext>
+    </p:extLst>
+  </p:cSld>
+  <p:clrMapOvr>
+    <a:masterClrMapping/>
+  </p:clrMapOvr>
+</p:sld>
+</file>
+
+<file path=ppt/slides/slide4.xml><?xml version="1.0" encoding="utf-8"?>
+<p:sld xmlns:a="http://schemas.openxmlformats.org/drawingml/2006/main" xmlns:r="http://schemas.openxmlformats.org/officeDocument/2006/relationships" xmlns:p="http://schemas.openxmlformats.org/presentationml/2006/main">
+  <p:cSld>
+    <p:spTree>
+      <p:nvGrpSpPr>
+        <p:cNvPr id="1" name=""/>
+        <p:cNvGrpSpPr/>
+        <p:nvPr/>
+      </p:nvGrpSpPr>
+      <p:grpSpPr>
+        <a:xfrm>
+          <a:off x="0" y="0"/>
+          <a:ext cx="0" cy="0"/>
+          <a:chOff x="0" y="0"/>
+          <a:chExt cx="0" cy="0"/>
+        </a:xfrm>
+      </p:grpSpPr>
+      <p:pic>
+        <p:nvPicPr>
+          <p:cNvPr id="5" name="Picture 4">
+            <a:extLst>
+              <a:ext uri="{FF2B5EF4-FFF2-40B4-BE49-F238E27FC236}">
+                <a16:creationId xmlns:a16="http://schemas.microsoft.com/office/drawing/2014/main" id="{047C5F20-AF41-FC4C-A3F5-23A045177421}"/>
+              </a:ext>
+            </a:extLst>
+          </p:cNvPr>
+          <p:cNvPicPr>
+            <a:picLocks noChangeAspect="1"/>
+          </p:cNvPicPr>
+          <p:nvPr/>
+        </p:nvPicPr>
+        <p:blipFill>
+          <a:blip r:embed="rId2"/>
+          <a:stretch>
+            <a:fillRect/>
+          </a:stretch>
+        </p:blipFill>
+        <p:spPr>
+          <a:xfrm>
+            <a:off x="5506423" y="253389"/>
+            <a:ext cx="2487168" cy="4386561"/>
+          </a:xfrm>
+          <a:prstGeom prst="rect">
+            <a:avLst/>
+          </a:prstGeom>
+        </p:spPr>
+      </p:pic>
+      <p:pic>
+        <p:nvPicPr>
+          <p:cNvPr id="7" name="Picture 6">
+            <a:extLst>
+              <a:ext uri="{FF2B5EF4-FFF2-40B4-BE49-F238E27FC236}">
+                <a16:creationId xmlns:a16="http://schemas.microsoft.com/office/drawing/2014/main" id="{601D08C9-A816-DA4A-8898-6C35D18D3DED}"/>
+              </a:ext>
+            </a:extLst>
+          </p:cNvPr>
+          <p:cNvPicPr>
+            <a:picLocks noChangeAspect="1"/>
+          </p:cNvPicPr>
+          <p:nvPr/>
+        </p:nvPicPr>
+        <p:blipFill>
+          <a:blip r:embed="rId3"/>
+          <a:stretch>
+            <a:fillRect/>
+          </a:stretch>
+        </p:blipFill>
+        <p:spPr>
+          <a:xfrm>
+            <a:off x="2388203" y="253389"/>
+            <a:ext cx="2468880" cy="4384299"/>
+          </a:xfrm>
+          <a:prstGeom prst="rect">
+            <a:avLst/>
+          </a:prstGeom>
+        </p:spPr>
+      </p:pic>
+    </p:spTree>
+    <p:extLst>
+      <p:ext uri="{BB962C8B-B14F-4D97-AF65-F5344CB8AC3E}">
+        <p14:creationId xmlns:p14="http://schemas.microsoft.com/office/powerpoint/2010/main" val="1013753815"/>
+      </p:ext>
+    </p:extLst>
+  </p:cSld>
+  <p:clrMapOvr>
+    <a:masterClrMapping/>
+  </p:clrMapOvr>
+</p:sld>
+</file>
+
+<file path=ppt/slides/slide5.xml><?xml version="1.0" encoding="utf-8"?>
+<p:sld xmlns:a="http://schemas.openxmlformats.org/drawingml/2006/main" xmlns:r="http://schemas.openxmlformats.org/officeDocument/2006/relationships" xmlns:p="http://schemas.openxmlformats.org/presentationml/2006/main">
+  <p:cSld>
+    <p:spTree>
+      <p:nvGrpSpPr>
+        <p:cNvPr id="1" name=""/>
+        <p:cNvGrpSpPr/>
+        <p:nvPr/>
+      </p:nvGrpSpPr>
+      <p:grpSpPr>
+        <a:xfrm>
+          <a:off x="0" y="0"/>
+          <a:ext cx="0" cy="0"/>
+          <a:chOff x="0" y="0"/>
+          <a:chExt cx="0" cy="0"/>
+        </a:xfrm>
+      </p:grpSpPr>
+      <p:sp>
+        <p:nvSpPr>
+          <p:cNvPr id="52" name="Right Arrow 51">
+            <a:extLst>
+              <a:ext uri="{FF2B5EF4-FFF2-40B4-BE49-F238E27FC236}">
+                <a16:creationId xmlns:a16="http://schemas.microsoft.com/office/drawing/2014/main" id="{93849BE9-50D3-D54D-967D-0CA76BCDB088}"/>
+              </a:ext>
+            </a:extLst>
+          </p:cNvPr>
+          <p:cNvSpPr/>
+          <p:nvPr/>
+        </p:nvSpPr>
+        <p:spPr>
+          <a:xfrm>
+            <a:off x="4683904" y="2971972"/>
+            <a:ext cx="460625" cy="308919"/>
+          </a:xfrm>
+          <a:prstGeom prst="rightArrow">
+            <a:avLst/>
+          </a:prstGeom>
+          <a:solidFill>
+            <a:schemeClr val="accent6"/>
+          </a:solidFill>
+          <a:ln>
+            <a:noFill/>
+          </a:ln>
+        </p:spPr>
+        <p:style>
+          <a:lnRef idx="2">
+            <a:schemeClr val="accent1">
+              <a:shade val="50000"/>
+            </a:schemeClr>
+          </a:lnRef>
+          <a:fillRef idx="1">
+            <a:schemeClr val="accent1"/>
+          </a:fillRef>
+          <a:effectRef idx="0">
+            <a:schemeClr val="accent1"/>
+          </a:effectRef>
+          <a:fontRef idx="minor">
+            <a:schemeClr val="lt1"/>
+          </a:fontRef>
+        </p:style>
+        <p:txBody>
+          <a:bodyPr rtlCol="0" anchor="ctr"/>
+          <a:lstStyle/>
+          <a:p>
+            <a:pPr algn="ctr"/>
+            <a:endParaRPr lang="en-US"/>
+          </a:p>
+        </p:txBody>
+      </p:sp>
+      <p:cxnSp>
+        <p:nvCxnSpPr>
+          <p:cNvPr id="6" name="Straight Arrow Connector 5">
+            <a:extLst>
+              <a:ext uri="{FF2B5EF4-FFF2-40B4-BE49-F238E27FC236}">
+                <a16:creationId xmlns:a16="http://schemas.microsoft.com/office/drawing/2014/main" id="{A3E0548E-0D3C-344C-BBB2-49F604B0AD61}"/>
+              </a:ext>
+            </a:extLst>
+          </p:cNvPr>
+          <p:cNvCxnSpPr>
+            <a:cxnSpLocks/>
+            <a:endCxn id="10" idx="2"/>
+          </p:cNvCxnSpPr>
+          <p:nvPr/>
+        </p:nvCxnSpPr>
+        <p:spPr>
+          <a:xfrm flipV="1">
+            <a:off x="7238082" y="3547432"/>
+            <a:ext cx="0" cy="277146"/>
+          </a:xfrm>
+          <a:prstGeom prst="straightConnector1">
+            <a:avLst/>
+          </a:prstGeom>
+          <a:ln w="25400">
+            <a:solidFill>
+              <a:schemeClr val="tx1"/>
+            </a:solidFill>
+            <a:tailEnd type="triangle"/>
+          </a:ln>
+        </p:spPr>
+        <p:style>
+          <a:lnRef idx="1">
+            <a:schemeClr val="accent1"/>
+          </a:lnRef>
+          <a:fillRef idx="0">
+            <a:schemeClr val="accent1"/>
+          </a:fillRef>
+          <a:effectRef idx="0">
+            <a:schemeClr val="accent1"/>
+          </a:effectRef>
+          <a:fontRef idx="minor">
+            <a:schemeClr val="tx1"/>
+          </a:fontRef>
+        </p:style>
+      </p:cxnSp>
+      <p:sp>
+        <p:nvSpPr>
+          <p:cNvPr id="10" name="Rounded Rectangle 9">
+            <a:extLst>
+              <a:ext uri="{FF2B5EF4-FFF2-40B4-BE49-F238E27FC236}">
+                <a16:creationId xmlns:a16="http://schemas.microsoft.com/office/drawing/2014/main" id="{985E8911-C8AB-B042-8685-818A6FBB032B}"/>
+              </a:ext>
+            </a:extLst>
+          </p:cNvPr>
+          <p:cNvSpPr/>
+          <p:nvPr/>
+        </p:nvSpPr>
+        <p:spPr>
+          <a:xfrm>
+            <a:off x="6400800" y="1948070"/>
+            <a:ext cx="1674564" cy="1599362"/>
+          </a:xfrm>
+          <a:prstGeom prst="roundRect">
+            <a:avLst>
+              <a:gd name="adj" fmla="val 4585"/>
+            </a:avLst>
+          </a:prstGeom>
+          <a:solidFill>
+            <a:srgbClr val="0070C0"/>
+          </a:solidFill>
+          <a:ln w="38100">
+            <a:noFill/>
+          </a:ln>
+        </p:spPr>
+        <p:style>
+          <a:lnRef idx="2">
+            <a:schemeClr val="accent1">
+              <a:shade val="50000"/>
+            </a:schemeClr>
+          </a:lnRef>
+          <a:fillRef idx="1">
+            <a:schemeClr val="accent1"/>
+          </a:fillRef>
+          <a:effectRef idx="0">
+            <a:schemeClr val="accent1"/>
+          </a:effectRef>
+          <a:fontRef idx="minor">
+            <a:schemeClr val="lt1"/>
+          </a:fontRef>
+        </p:style>
+        <p:txBody>
+          <a:bodyPr rtlCol="0" anchor="t"/>
+          <a:lstStyle/>
+          <a:p>
+            <a:pPr algn="ctr"/>
+            <a:r>
+              <a:rPr lang="en-US" sz="1600" dirty="0">
+                <a:solidFill>
+                  <a:schemeClr val="tx1"/>
+                </a:solidFill>
+              </a:rPr>
+              <a:t>LLM</a:t>
+            </a:r>
+          </a:p>
+        </p:txBody>
+      </p:sp>
+      <p:grpSp>
+        <p:nvGrpSpPr>
+          <p:cNvPr id="17" name="Group 16">
+            <a:extLst>
+              <a:ext uri="{FF2B5EF4-FFF2-40B4-BE49-F238E27FC236}">
+                <a16:creationId xmlns:a16="http://schemas.microsoft.com/office/drawing/2014/main" id="{CCBB3A43-1E00-AB4D-9D0F-35A2C2AE9C73}"/>
+              </a:ext>
+            </a:extLst>
+          </p:cNvPr>
+          <p:cNvGrpSpPr/>
+          <p:nvPr/>
+        </p:nvGrpSpPr>
+        <p:grpSpPr>
+          <a:xfrm>
+            <a:off x="5144530" y="2322723"/>
+            <a:ext cx="2856176" cy="1224709"/>
+            <a:chOff x="5144530" y="2322723"/>
+            <a:chExt cx="2856176" cy="1224709"/>
+          </a:xfrm>
+          <a:solidFill>
+            <a:srgbClr val="FFC000"/>
+          </a:solidFill>
+        </p:grpSpPr>
+        <p:sp>
+          <p:nvSpPr>
+            <p:cNvPr id="11" name="Rounded Rectangle 10">
+              <a:extLst>
+                <a:ext uri="{FF2B5EF4-FFF2-40B4-BE49-F238E27FC236}">
+                  <a16:creationId xmlns:a16="http://schemas.microsoft.com/office/drawing/2014/main" id="{FE3D0CD0-6069-FA44-A1C7-280F0D24C74E}"/>
+                </a:ext>
+              </a:extLst>
+            </p:cNvPr>
+            <p:cNvSpPr/>
+            <p:nvPr/>
+          </p:nvSpPr>
+          <p:spPr>
+            <a:xfrm>
+              <a:off x="5870154" y="2322724"/>
+              <a:ext cx="2130552" cy="137160"/>
+            </a:xfrm>
+            <a:prstGeom prst="roundRect">
+              <a:avLst>
+                <a:gd name="adj" fmla="val 21544"/>
+              </a:avLst>
+            </a:prstGeom>
+            <a:grpFill/>
+            <a:ln w="38100">
+              <a:noFill/>
+            </a:ln>
+          </p:spPr>
+          <p:style>
+            <a:lnRef idx="2">
+              <a:schemeClr val="accent1">
+                <a:shade val="50000"/>
+              </a:schemeClr>
+            </a:lnRef>
+            <a:fillRef idx="1">
+              <a:schemeClr val="accent1"/>
+            </a:fillRef>
+            <a:effectRef idx="0">
+              <a:schemeClr val="accent1"/>
+            </a:effectRef>
+            <a:fontRef idx="minor">
+              <a:schemeClr val="lt1"/>
+            </a:fontRef>
+          </p:style>
+          <p:txBody>
+            <a:bodyPr rtlCol="0" anchor="ctr"/>
+            <a:lstStyle/>
+            <a:p>
+              <a:pPr algn="ctr"/>
+              <a:endParaRPr lang="en-US"/>
+            </a:p>
+          </p:txBody>
+        </p:sp>
+        <p:sp>
+          <p:nvSpPr>
+            <p:cNvPr id="13" name="Rounded Rectangle 12">
+              <a:extLst>
+                <a:ext uri="{FF2B5EF4-FFF2-40B4-BE49-F238E27FC236}">
+                  <a16:creationId xmlns:a16="http://schemas.microsoft.com/office/drawing/2014/main" id="{1136D88C-D948-2940-A9A8-AB37AA1228F5}"/>
+                </a:ext>
+              </a:extLst>
+            </p:cNvPr>
+            <p:cNvSpPr/>
+            <p:nvPr/>
+          </p:nvSpPr>
+          <p:spPr>
+            <a:xfrm>
+              <a:off x="5870154" y="2625871"/>
+              <a:ext cx="2130552" cy="137160"/>
+            </a:xfrm>
+            <a:prstGeom prst="roundRect">
+              <a:avLst>
+                <a:gd name="adj" fmla="val 21544"/>
+              </a:avLst>
+            </a:prstGeom>
+            <a:grpFill/>
+            <a:ln w="38100">
+              <a:noFill/>
+            </a:ln>
+          </p:spPr>
+          <p:style>
+            <a:lnRef idx="2">
+              <a:schemeClr val="accent1">
+                <a:shade val="50000"/>
+              </a:schemeClr>
+            </a:lnRef>
+            <a:fillRef idx="1">
+              <a:schemeClr val="accent1"/>
+            </a:fillRef>
+            <a:effectRef idx="0">
+              <a:schemeClr val="accent1"/>
+            </a:effectRef>
+            <a:fontRef idx="minor">
+              <a:schemeClr val="lt1"/>
+            </a:fontRef>
+          </p:style>
+          <p:txBody>
+            <a:bodyPr rtlCol="0" anchor="ctr"/>
+            <a:lstStyle/>
+            <a:p>
+              <a:pPr algn="ctr"/>
+              <a:endParaRPr lang="en-US"/>
+            </a:p>
+          </p:txBody>
+        </p:sp>
+        <p:sp>
+          <p:nvSpPr>
+            <p:cNvPr id="14" name="Rounded Rectangle 13">
+              <a:extLst>
+                <a:ext uri="{FF2B5EF4-FFF2-40B4-BE49-F238E27FC236}">
+                  <a16:creationId xmlns:a16="http://schemas.microsoft.com/office/drawing/2014/main" id="{5E7C1B58-66ED-F647-AF54-9AB96A252E1C}"/>
+                </a:ext>
+              </a:extLst>
+            </p:cNvPr>
+            <p:cNvSpPr/>
+            <p:nvPr/>
+          </p:nvSpPr>
+          <p:spPr>
+            <a:xfrm>
+              <a:off x="5870154" y="2933893"/>
+              <a:ext cx="2130552" cy="137160"/>
+            </a:xfrm>
+            <a:prstGeom prst="roundRect">
+              <a:avLst>
+                <a:gd name="adj" fmla="val 21544"/>
+              </a:avLst>
+            </a:prstGeom>
+            <a:grpFill/>
+            <a:ln w="38100">
+              <a:noFill/>
+            </a:ln>
+          </p:spPr>
+          <p:style>
+            <a:lnRef idx="2">
+              <a:schemeClr val="accent1">
+                <a:shade val="50000"/>
+              </a:schemeClr>
+            </a:lnRef>
+            <a:fillRef idx="1">
+              <a:schemeClr val="accent1"/>
+            </a:fillRef>
+            <a:effectRef idx="0">
+              <a:schemeClr val="accent1"/>
+            </a:effectRef>
+            <a:fontRef idx="minor">
+              <a:schemeClr val="lt1"/>
+            </a:fontRef>
+          </p:style>
+          <p:txBody>
+            <a:bodyPr rtlCol="0" anchor="ctr"/>
+            <a:lstStyle/>
+            <a:p>
+              <a:pPr algn="ctr"/>
+              <a:endParaRPr lang="en-US"/>
+            </a:p>
+          </p:txBody>
+        </p:sp>
+        <p:sp>
+          <p:nvSpPr>
+            <p:cNvPr id="15" name="Rounded Rectangle 14">
+              <a:extLst>
+                <a:ext uri="{FF2B5EF4-FFF2-40B4-BE49-F238E27FC236}">
+                  <a16:creationId xmlns:a16="http://schemas.microsoft.com/office/drawing/2014/main" id="{AF743ADA-4260-6247-B199-5A7ED5A19D73}"/>
+                </a:ext>
+              </a:extLst>
+            </p:cNvPr>
+            <p:cNvSpPr/>
+            <p:nvPr/>
+          </p:nvSpPr>
+          <p:spPr>
+            <a:xfrm>
+              <a:off x="5870154" y="3240662"/>
+              <a:ext cx="2130552" cy="137160"/>
+            </a:xfrm>
+            <a:prstGeom prst="roundRect">
+              <a:avLst>
+                <a:gd name="adj" fmla="val 21544"/>
+              </a:avLst>
+            </a:prstGeom>
+            <a:grpFill/>
+            <a:ln w="38100">
+              <a:noFill/>
+            </a:ln>
+          </p:spPr>
+          <p:style>
+            <a:lnRef idx="2">
+              <a:schemeClr val="accent1">
+                <a:shade val="50000"/>
+              </a:schemeClr>
+            </a:lnRef>
+            <a:fillRef idx="1">
+              <a:schemeClr val="accent1"/>
+            </a:fillRef>
+            <a:effectRef idx="0">
+              <a:schemeClr val="accent1"/>
+            </a:effectRef>
+            <a:fontRef idx="minor">
+              <a:schemeClr val="lt1"/>
+            </a:fontRef>
+          </p:style>
+          <p:txBody>
+            <a:bodyPr rtlCol="0" anchor="ctr"/>
+            <a:lstStyle/>
+            <a:p>
+              <a:pPr algn="ctr"/>
+              <a:endParaRPr lang="en-US"/>
+            </a:p>
+          </p:txBody>
+        </p:sp>
+        <p:sp>
+          <p:nvSpPr>
+            <p:cNvPr id="16" name="Rounded Rectangle 15">
+              <a:extLst>
+                <a:ext uri="{FF2B5EF4-FFF2-40B4-BE49-F238E27FC236}">
+                  <a16:creationId xmlns:a16="http://schemas.microsoft.com/office/drawing/2014/main" id="{8BF716E8-46BC-6B43-983B-1FD97E0E1019}"/>
+                </a:ext>
+              </a:extLst>
+            </p:cNvPr>
+            <p:cNvSpPr/>
+            <p:nvPr/>
+          </p:nvSpPr>
+          <p:spPr>
+            <a:xfrm>
+              <a:off x="5144530" y="2322723"/>
+              <a:ext cx="1181612" cy="1224709"/>
+            </a:xfrm>
+            <a:prstGeom prst="roundRect">
+              <a:avLst>
+                <a:gd name="adj" fmla="val 4983"/>
+              </a:avLst>
+            </a:prstGeom>
+            <a:grpFill/>
+            <a:ln w="38100">
+              <a:noFill/>
+            </a:ln>
+          </p:spPr>
+          <p:style>
+            <a:lnRef idx="2">
+              <a:schemeClr val="accent1">
+                <a:shade val="50000"/>
+              </a:schemeClr>
+            </a:lnRef>
+            <a:fillRef idx="1">
+              <a:schemeClr val="accent1"/>
+            </a:fillRef>
+            <a:effectRef idx="0">
+              <a:schemeClr val="accent1"/>
+            </a:effectRef>
+            <a:fontRef idx="minor">
+              <a:schemeClr val="lt1"/>
+            </a:fontRef>
+          </p:style>
+          <p:txBody>
+            <a:bodyPr rtlCol="0" anchor="ctr"/>
+            <a:lstStyle/>
+            <a:p>
+              <a:pPr algn="ctr"/>
+              <a:r>
+                <a:rPr lang="en-US" sz="1600" dirty="0">
+                  <a:solidFill>
+                    <a:schemeClr val="tx1"/>
+                  </a:solidFill>
+                </a:rPr>
+                <a:t>Modality</a:t>
+              </a:r>
+              <a:br>
+                <a:rPr lang="en-US" sz="1600" dirty="0">
+                  <a:solidFill>
+                    <a:schemeClr val="tx1"/>
+                  </a:solidFill>
+                </a:rPr>
+              </a:br>
+              <a:r>
+                <a:rPr lang="en-US" sz="1600" dirty="0">
+                  <a:solidFill>
+                    <a:schemeClr val="tx1"/>
+                  </a:solidFill>
+                </a:rPr>
+                <a:t>Fusion</a:t>
+              </a:r>
+            </a:p>
+            <a:p>
+              <a:pPr algn="ctr"/>
+              <a:r>
+                <a:rPr lang="en-US" sz="1600" dirty="0">
+                  <a:solidFill>
+                    <a:schemeClr val="tx1"/>
+                  </a:solidFill>
+                </a:rPr>
+                <a:t>Network</a:t>
+              </a:r>
+            </a:p>
+          </p:txBody>
+        </p:sp>
+      </p:grpSp>
+      <p:cxnSp>
+        <p:nvCxnSpPr>
+          <p:cNvPr id="22" name="Straight Arrow Connector 21">
+            <a:extLst>
+              <a:ext uri="{FF2B5EF4-FFF2-40B4-BE49-F238E27FC236}">
+                <a16:creationId xmlns:a16="http://schemas.microsoft.com/office/drawing/2014/main" id="{5A68E279-9920-2E48-985D-5B8C1AF9F83E}"/>
+              </a:ext>
+            </a:extLst>
+          </p:cNvPr>
+          <p:cNvCxnSpPr>
+            <a:cxnSpLocks/>
+            <a:stCxn id="10" idx="0"/>
+            <a:endCxn id="25" idx="2"/>
+          </p:cNvCxnSpPr>
+          <p:nvPr/>
+        </p:nvCxnSpPr>
+        <p:spPr>
+          <a:xfrm flipV="1">
+            <a:off x="7238082" y="1657741"/>
+            <a:ext cx="0" cy="290329"/>
+          </a:xfrm>
+          <a:prstGeom prst="straightConnector1">
+            <a:avLst/>
+          </a:prstGeom>
+          <a:ln w="25400">
+            <a:solidFill>
+              <a:schemeClr val="tx1"/>
+            </a:solidFill>
+            <a:tailEnd type="triangle"/>
+          </a:ln>
+        </p:spPr>
+        <p:style>
+          <a:lnRef idx="1">
+            <a:schemeClr val="accent1"/>
+          </a:lnRef>
+          <a:fillRef idx="0">
+            <a:schemeClr val="accent1"/>
+          </a:fillRef>
+          <a:effectRef idx="0">
+            <a:schemeClr val="accent1"/>
+          </a:effectRef>
+          <a:fontRef idx="minor">
+            <a:schemeClr val="tx1"/>
+          </a:fontRef>
+        </p:style>
+      </p:cxnSp>
+      <p:sp>
+        <p:nvSpPr>
+          <p:cNvPr id="25" name="TextBox 24">
+            <a:extLst>
+              <a:ext uri="{FF2B5EF4-FFF2-40B4-BE49-F238E27FC236}">
+                <a16:creationId xmlns:a16="http://schemas.microsoft.com/office/drawing/2014/main" id="{CE5A302A-BEF6-8945-A380-0CE57534137D}"/>
+              </a:ext>
+            </a:extLst>
+          </p:cNvPr>
+          <p:cNvSpPr txBox="1"/>
+          <p:nvPr/>
+        </p:nvSpPr>
+        <p:spPr>
+          <a:xfrm>
+            <a:off x="6670106" y="1380742"/>
+            <a:ext cx="1135952" cy="276999"/>
+          </a:xfrm>
+          <a:prstGeom prst="rect">
+            <a:avLst/>
+          </a:prstGeom>
+          <a:noFill/>
+        </p:spPr>
+        <p:txBody>
+          <a:bodyPr wrap="none" rtlCol="0">
+            <a:spAutoFit/>
+          </a:bodyPr>
+          <a:lstStyle/>
+          <a:p>
+            <a:r>
+              <a:rPr lang="en-US" sz="1200" dirty="0"/>
+              <a:t>Generated Text</a:t>
+            </a:r>
+          </a:p>
+        </p:txBody>
+      </p:sp>
+      <p:sp>
+        <p:nvSpPr>
+          <p:cNvPr id="26" name="TextBox 25">
+            <a:extLst>
+              <a:ext uri="{FF2B5EF4-FFF2-40B4-BE49-F238E27FC236}">
+                <a16:creationId xmlns:a16="http://schemas.microsoft.com/office/drawing/2014/main" id="{06359AB5-AF4F-FE43-9370-48CD55147EDE}"/>
+              </a:ext>
+            </a:extLst>
+          </p:cNvPr>
+          <p:cNvSpPr txBox="1"/>
+          <p:nvPr/>
+        </p:nvSpPr>
+        <p:spPr>
+          <a:xfrm>
+            <a:off x="6835312" y="3757371"/>
+            <a:ext cx="805542" cy="276999"/>
+          </a:xfrm>
+          <a:prstGeom prst="rect">
+            <a:avLst/>
+          </a:prstGeom>
+          <a:noFill/>
+        </p:spPr>
+        <p:txBody>
+          <a:bodyPr wrap="none" rtlCol="0">
+            <a:spAutoFit/>
+          </a:bodyPr>
+          <a:lstStyle/>
+          <a:p>
+            <a:pPr algn="ctr"/>
+            <a:r>
+              <a:rPr lang="en-US" sz="1200" dirty="0"/>
+              <a:t>Input Text</a:t>
+            </a:r>
+          </a:p>
+        </p:txBody>
+      </p:sp>
+      <p:sp>
+        <p:nvSpPr>
+          <p:cNvPr id="31" name="Rounded Rectangle 30">
+            <a:extLst>
+              <a:ext uri="{FF2B5EF4-FFF2-40B4-BE49-F238E27FC236}">
+                <a16:creationId xmlns:a16="http://schemas.microsoft.com/office/drawing/2014/main" id="{F451B8CD-C21C-FC41-976A-C76AEFBA9D2C}"/>
+              </a:ext>
+            </a:extLst>
+          </p:cNvPr>
+          <p:cNvSpPr/>
+          <p:nvPr/>
+        </p:nvSpPr>
+        <p:spPr>
+          <a:xfrm>
+            <a:off x="3390994" y="2816384"/>
+            <a:ext cx="1143935" cy="273848"/>
+          </a:xfrm>
+          <a:prstGeom prst="roundRect">
+            <a:avLst>
+              <a:gd name="adj" fmla="val 4983"/>
+            </a:avLst>
+          </a:prstGeom>
+          <a:ln w="31750"/>
+        </p:spPr>
+        <p:style>
+          <a:lnRef idx="2">
+            <a:schemeClr val="accent6"/>
+          </a:lnRef>
+          <a:fillRef idx="1">
+            <a:schemeClr val="lt1"/>
+          </a:fillRef>
+          <a:effectRef idx="0">
+            <a:schemeClr val="accent6"/>
+          </a:effectRef>
+          <a:fontRef idx="minor">
+            <a:schemeClr val="dk1"/>
+          </a:fontRef>
+        </p:style>
+        <p:txBody>
+          <a:bodyPr rtlCol="0" anchor="ctr"/>
+          <a:lstStyle/>
+          <a:p>
+            <a:pPr algn="ctr"/>
+            <a:endParaRPr lang="en-US" dirty="0">
+              <a:solidFill>
+                <a:schemeClr val="tx1"/>
+              </a:solidFill>
+            </a:endParaRPr>
+          </a:p>
+        </p:txBody>
+      </p:sp>
+      <p:sp>
+        <p:nvSpPr>
+          <p:cNvPr id="33" name="Rounded Rectangle 32">
+            <a:extLst>
+              <a:ext uri="{FF2B5EF4-FFF2-40B4-BE49-F238E27FC236}">
+                <a16:creationId xmlns:a16="http://schemas.microsoft.com/office/drawing/2014/main" id="{93C9A98A-AFE0-9941-B2B0-E6C6A07955DA}"/>
+              </a:ext>
+            </a:extLst>
+          </p:cNvPr>
+          <p:cNvSpPr/>
+          <p:nvPr/>
+        </p:nvSpPr>
+        <p:spPr>
+          <a:xfrm>
+            <a:off x="3543394" y="2968784"/>
+            <a:ext cx="1143935" cy="273848"/>
+          </a:xfrm>
+          <a:prstGeom prst="roundRect">
+            <a:avLst>
+              <a:gd name="adj" fmla="val 4983"/>
+            </a:avLst>
+          </a:prstGeom>
+          <a:ln w="31750"/>
+        </p:spPr>
+        <p:style>
+          <a:lnRef idx="2">
+            <a:schemeClr val="accent6"/>
+          </a:lnRef>
+          <a:fillRef idx="1">
+            <a:schemeClr val="lt1"/>
+          </a:fillRef>
+          <a:effectRef idx="0">
+            <a:schemeClr val="accent6"/>
+          </a:effectRef>
+          <a:fontRef idx="minor">
+            <a:schemeClr val="dk1"/>
+          </a:fontRef>
+        </p:style>
+        <p:txBody>
+          <a:bodyPr rtlCol="0" anchor="ctr"/>
+          <a:lstStyle/>
+          <a:p>
+            <a:pPr algn="ctr"/>
+            <a:endParaRPr lang="en-US" dirty="0">
+              <a:solidFill>
+                <a:schemeClr val="tx1"/>
+              </a:solidFill>
+            </a:endParaRPr>
+          </a:p>
+        </p:txBody>
+      </p:sp>
+      <p:sp>
+        <p:nvSpPr>
+          <p:cNvPr id="34" name="Rounded Rectangle 33">
+            <a:extLst>
+              <a:ext uri="{FF2B5EF4-FFF2-40B4-BE49-F238E27FC236}">
+                <a16:creationId xmlns:a16="http://schemas.microsoft.com/office/drawing/2014/main" id="{033D2443-D78D-D84A-A66B-E38F7A3E1CC5}"/>
+              </a:ext>
+            </a:extLst>
+          </p:cNvPr>
+          <p:cNvSpPr/>
+          <p:nvPr/>
+        </p:nvSpPr>
+        <p:spPr>
+          <a:xfrm>
+            <a:off x="3695794" y="3121184"/>
+            <a:ext cx="1143935" cy="273848"/>
+          </a:xfrm>
+          <a:prstGeom prst="roundRect">
+            <a:avLst>
+              <a:gd name="adj" fmla="val 4983"/>
+            </a:avLst>
+          </a:prstGeom>
+          <a:ln w="31750"/>
+        </p:spPr>
+        <p:style>
+          <a:lnRef idx="2">
+            <a:schemeClr val="accent6"/>
+          </a:lnRef>
+          <a:fillRef idx="1">
+            <a:schemeClr val="lt1"/>
+          </a:fillRef>
+          <a:effectRef idx="0">
+            <a:schemeClr val="accent6"/>
+          </a:effectRef>
+          <a:fontRef idx="minor">
+            <a:schemeClr val="dk1"/>
+          </a:fontRef>
+        </p:style>
+        <p:txBody>
+          <a:bodyPr rtlCol="0" anchor="ctr"/>
+          <a:lstStyle/>
+          <a:p>
+            <a:pPr algn="ctr"/>
+            <a:endParaRPr lang="en-US" dirty="0">
+              <a:solidFill>
+                <a:schemeClr val="tx1"/>
+              </a:solidFill>
+            </a:endParaRPr>
+          </a:p>
+        </p:txBody>
+      </p:sp>
+      <p:sp>
+        <p:nvSpPr>
+          <p:cNvPr id="35" name="Rounded Rectangle 34">
+            <a:extLst>
+              <a:ext uri="{FF2B5EF4-FFF2-40B4-BE49-F238E27FC236}">
+                <a16:creationId xmlns:a16="http://schemas.microsoft.com/office/drawing/2014/main" id="{82F257CD-BE7F-764D-9908-AE59B9E021B9}"/>
+              </a:ext>
+            </a:extLst>
+          </p:cNvPr>
+          <p:cNvSpPr/>
+          <p:nvPr/>
+        </p:nvSpPr>
+        <p:spPr>
+          <a:xfrm>
+            <a:off x="3848194" y="3273584"/>
+            <a:ext cx="1143935" cy="273848"/>
+          </a:xfrm>
+          <a:prstGeom prst="roundRect">
+            <a:avLst>
+              <a:gd name="adj" fmla="val 4983"/>
+            </a:avLst>
+          </a:prstGeom>
+          <a:ln w="31750"/>
+        </p:spPr>
+        <p:style>
+          <a:lnRef idx="2">
+            <a:schemeClr val="accent6"/>
+          </a:lnRef>
+          <a:fillRef idx="1">
+            <a:schemeClr val="lt1"/>
+          </a:fillRef>
+          <a:effectRef idx="0">
+            <a:schemeClr val="accent6"/>
+          </a:effectRef>
+          <a:fontRef idx="minor">
+            <a:schemeClr val="dk1"/>
+          </a:fontRef>
+        </p:style>
+        <p:txBody>
+          <a:bodyPr rtlCol="0" anchor="ctr"/>
+          <a:lstStyle/>
+          <a:p>
+            <a:pPr algn="ctr"/>
+            <a:endParaRPr lang="en-US" dirty="0">
+              <a:solidFill>
+                <a:schemeClr val="tx1"/>
+              </a:solidFill>
+            </a:endParaRPr>
+          </a:p>
+        </p:txBody>
+      </p:sp>
+      <p:sp>
+        <p:nvSpPr>
+          <p:cNvPr id="36" name="TextBox 35">
+            <a:extLst>
+              <a:ext uri="{FF2B5EF4-FFF2-40B4-BE49-F238E27FC236}">
+                <a16:creationId xmlns:a16="http://schemas.microsoft.com/office/drawing/2014/main" id="{ACCE9737-928E-3C4B-8990-F06B7E382CDD}"/>
+              </a:ext>
+            </a:extLst>
+          </p:cNvPr>
+          <p:cNvSpPr txBox="1"/>
+          <p:nvPr/>
+        </p:nvSpPr>
+        <p:spPr>
+          <a:xfrm>
+            <a:off x="3164501" y="2459884"/>
+            <a:ext cx="1778051" cy="338554"/>
+          </a:xfrm>
+          <a:prstGeom prst="rect">
+            <a:avLst/>
+          </a:prstGeom>
+          <a:noFill/>
+        </p:spPr>
+        <p:txBody>
+          <a:bodyPr wrap="none" rtlCol="0">
+            <a:spAutoFit/>
+          </a:bodyPr>
+          <a:lstStyle/>
+          <a:p>
+            <a:r>
+              <a:rPr lang="en-US" sz="1600" dirty="0"/>
+              <a:t>Modality Enc. Bank</a:t>
+            </a:r>
+          </a:p>
+        </p:txBody>
+      </p:sp>
+      <p:cxnSp>
+        <p:nvCxnSpPr>
+          <p:cNvPr id="53" name="Straight Arrow Connector 52">
+            <a:extLst>
+              <a:ext uri="{FF2B5EF4-FFF2-40B4-BE49-F238E27FC236}">
+                <a16:creationId xmlns:a16="http://schemas.microsoft.com/office/drawing/2014/main" id="{75085BEC-5590-AD40-A770-CB61DEEA453E}"/>
+              </a:ext>
+            </a:extLst>
+          </p:cNvPr>
+          <p:cNvCxnSpPr>
+            <a:cxnSpLocks/>
+          </p:cNvCxnSpPr>
+          <p:nvPr/>
+        </p:nvCxnSpPr>
+        <p:spPr>
+          <a:xfrm flipV="1">
+            <a:off x="4154514" y="3547432"/>
+            <a:ext cx="1" cy="277145"/>
+          </a:xfrm>
+          <a:prstGeom prst="straightConnector1">
+            <a:avLst/>
+          </a:prstGeom>
+          <a:ln w="25400">
+            <a:solidFill>
+              <a:schemeClr val="tx1"/>
+            </a:solidFill>
+            <a:tailEnd type="triangle"/>
+          </a:ln>
+        </p:spPr>
+        <p:style>
+          <a:lnRef idx="1">
+            <a:schemeClr val="accent1"/>
+          </a:lnRef>
+          <a:fillRef idx="0">
+            <a:schemeClr val="accent1"/>
+          </a:fillRef>
+          <a:effectRef idx="0">
+            <a:schemeClr val="accent1"/>
+          </a:effectRef>
+          <a:fontRef idx="minor">
+            <a:schemeClr val="tx1"/>
+          </a:fontRef>
+        </p:style>
+      </p:cxnSp>
+      <p:sp>
+        <p:nvSpPr>
+          <p:cNvPr id="54" name="TextBox 53">
+            <a:extLst>
+              <a:ext uri="{FF2B5EF4-FFF2-40B4-BE49-F238E27FC236}">
+                <a16:creationId xmlns:a16="http://schemas.microsoft.com/office/drawing/2014/main" id="{C7C1F77C-9D7C-9B4D-883E-1EB76A3EFE32}"/>
+              </a:ext>
+            </a:extLst>
+          </p:cNvPr>
+          <p:cNvSpPr txBox="1"/>
+          <p:nvPr/>
+        </p:nvSpPr>
+        <p:spPr>
+          <a:xfrm>
+            <a:off x="3848194" y="3771271"/>
+            <a:ext cx="2271263" cy="276999"/>
+          </a:xfrm>
+          <a:prstGeom prst="rect">
+            <a:avLst/>
+          </a:prstGeom>
+          <a:noFill/>
+        </p:spPr>
+        <p:txBody>
+          <a:bodyPr wrap="none" rtlCol="0">
+            <a:spAutoFit/>
+          </a:bodyPr>
+          <a:lstStyle/>
+          <a:p>
+            <a:r>
+              <a:rPr lang="en-US" sz="1200" dirty="0"/>
+              <a:t>Layout, Image, </a:t>
+            </a:r>
+            <a:r>
+              <a:rPr lang="en-US" sz="1200" dirty="0" err="1"/>
+              <a:t>Bbox</a:t>
+            </a:r>
+            <a:r>
+              <a:rPr lang="en-US" sz="1200" dirty="0"/>
+              <a:t> Metadata, …</a:t>
+            </a:r>
+          </a:p>
+        </p:txBody>
+      </p:sp>
+    </p:spTree>
+    <p:extLst>
+      <p:ext uri="{BB962C8B-B14F-4D97-AF65-F5344CB8AC3E}">
+        <p14:creationId xmlns:p14="http://schemas.microsoft.com/office/powerpoint/2010/main" val="2243848828"/>
       </p:ext>
     </p:extLst>
   </p:cSld>

</xml_diff>